<commit_message>
updates to several slides
</commit_message>
<xml_diff>
--- a/PowerPoints/13 - Subprograms.pptx
+++ b/PowerPoints/13 - Subprograms.pptx
@@ -25428,7 +25428,18 @@
           <a:p>
             <a:r>
               <a:rPr lang="en-US" dirty="0"/>
-              <a:t>Note that the code for class </a:t>
+              <a:t>When you have a </a:t>
+            </a:r>
+            <a:r>
+              <a:rPr lang="en-US" dirty="0" err="1">
+                <a:latin typeface="Consolas" pitchFamily="49" charset="0"/>
+                <a:cs typeface="Consolas" pitchFamily="49" charset="0"/>
+              </a:rPr>
+              <a:t>VariableExpr</a:t>
+            </a:r>
+            <a:r>
+              <a:rPr lang="en-US" dirty="0"/>
+              <a:t> expression corresponding to a variable parameter, you need to convert it to a </a:t>
             </a:r>
             <a:r>
               <a:rPr lang="en-US" dirty="0">
@@ -25439,29 +25450,7 @@
             </a:r>
             <a:r>
               <a:rPr lang="en-US" dirty="0"/>
-              <a:t> contains a constructor that takes a single </a:t>
-            </a:r>
-            <a:r>
-              <a:rPr lang="en-US" dirty="0" err="1">
-                <a:latin typeface="Consolas" pitchFamily="49" charset="0"/>
-                <a:cs typeface="Consolas" pitchFamily="49" charset="0"/>
-              </a:rPr>
-              <a:t>VariableExpr</a:t>
-            </a:r>
-            <a:r>
-              <a:rPr lang="en-US" dirty="0"/>
-              <a:t> object and uses it to construct a </a:t>
-            </a:r>
-            <a:r>
-              <a:rPr lang="en-US" dirty="0">
-                <a:latin typeface="Consolas" pitchFamily="49" charset="0"/>
-                <a:cs typeface="Consolas" pitchFamily="49" charset="0"/>
-              </a:rPr>
-              <a:t>Variable</a:t>
-            </a:r>
-            <a:r>
-              <a:rPr lang="en-US" dirty="0"/>
-              <a:t> object.</a:t>
+              <a:t>.</a:t>
             </a:r>
           </a:p>
         </p:txBody>
@@ -25610,7 +25599,18 @@
           <a:p>
             <a:r>
               <a:rPr lang="en-US" dirty="0"/>
-              <a:t>When you have a </a:t>
+              <a:t>Note that the code for class </a:t>
+            </a:r>
+            <a:r>
+              <a:rPr lang="en-US" dirty="0">
+                <a:latin typeface="Consolas" pitchFamily="49" charset="0"/>
+                <a:cs typeface="Consolas" pitchFamily="49" charset="0"/>
+              </a:rPr>
+              <a:t>Variable</a:t>
+            </a:r>
+            <a:r>
+              <a:rPr lang="en-US" dirty="0"/>
+              <a:t> contains a constructor that takes a single </a:t>
             </a:r>
             <a:r>
               <a:rPr lang="en-US" dirty="0" err="1">
@@ -25621,7 +25621,7 @@
             </a:r>
             <a:r>
               <a:rPr lang="en-US" dirty="0"/>
-              <a:t> expression corresponding to a variable parameter, you need to convert it to a </a:t>
+              <a:t> object and uses it to construct a </a:t>
             </a:r>
             <a:r>
               <a:rPr lang="en-US" dirty="0">
@@ -25632,7 +25632,7 @@
             </a:r>
             <a:r>
               <a:rPr lang="en-US" dirty="0"/>
-              <a:t>.</a:t>
+              <a:t> object.</a:t>
             </a:r>
           </a:p>
           <a:p>
@@ -25908,7 +25908,7 @@
                 <a:latin typeface="Consolas" pitchFamily="49" charset="0"/>
                 <a:cs typeface="Consolas" pitchFamily="49" charset="0"/>
               </a:rPr>
-              <a:t>for (int i = 0;  i &lt; </a:t>
+              <a:t>for (int i = 0; i &lt; </a:t>
             </a:r>
             <a:r>
               <a:rPr lang="en-US" sz="1800" dirty="0" err="1">
@@ -25922,7 +25922,7 @@
                 <a:latin typeface="Consolas" pitchFamily="49" charset="0"/>
                 <a:cs typeface="Consolas" pitchFamily="49" charset="0"/>
               </a:rPr>
-              <a:t>();  ++i)</a:t>
+              <a:t>(); ++i)</a:t>
             </a:r>
           </a:p>
           <a:p>
@@ -25952,7 +25952,7 @@
                 <a:latin typeface="Consolas" pitchFamily="49" charset="0"/>
                 <a:cs typeface="Consolas" pitchFamily="49" charset="0"/>
               </a:rPr>
-              <a:t>    var expr  = </a:t>
+              <a:t>    var expr = </a:t>
             </a:r>
             <a:r>
               <a:rPr lang="en-US" sz="1800" dirty="0" err="1">
@@ -25981,14 +25981,28 @@
                 <a:latin typeface="Consolas" pitchFamily="49" charset="0"/>
                 <a:cs typeface="Consolas" pitchFamily="49" charset="0"/>
               </a:rPr>
-              <a:t>    var param = </a:t>
+              <a:t>    var </a:t>
             </a:r>
             <a:r>
               <a:rPr lang="en-US" sz="1800" dirty="0" err="1">
                 <a:latin typeface="Consolas" pitchFamily="49" charset="0"/>
                 <a:cs typeface="Consolas" pitchFamily="49" charset="0"/>
               </a:rPr>
-              <a:t>formalParams.get</a:t>
+              <a:t>paramDecl</a:t>
+            </a:r>
+            <a:r>
+              <a:rPr lang="en-US" sz="1800" dirty="0">
+                <a:latin typeface="Consolas" pitchFamily="49" charset="0"/>
+                <a:cs typeface="Consolas" pitchFamily="49" charset="0"/>
+              </a:rPr>
+              <a:t> = </a:t>
+            </a:r>
+            <a:r>
+              <a:rPr lang="en-US" sz="1800" dirty="0" err="1">
+                <a:latin typeface="Consolas" pitchFamily="49" charset="0"/>
+                <a:cs typeface="Consolas" pitchFamily="49" charset="0"/>
+              </a:rPr>
+              <a:t>paramDecls.get</a:t>
             </a:r>
             <a:r>
               <a:rPr lang="en-US" sz="1800" dirty="0">
@@ -26378,7 +26392,7 @@
                 <a:latin typeface="Consolas" pitchFamily="49" charset="0"/>
                 <a:cs typeface="Consolas" pitchFamily="49" charset="0"/>
               </a:rPr>
-              <a:t>param.isVarParam</a:t>
+              <a:t>paramDecl.isVarParam</a:t>
             </a:r>
             <a:r>
               <a:rPr lang="en-US" sz="1800" dirty="0">
@@ -26415,31 +26429,52 @@
                 <a:latin typeface="Consolas" pitchFamily="49" charset="0"/>
                 <a:cs typeface="Consolas" pitchFamily="49" charset="0"/>
               </a:rPr>
-              <a:t>    if (expr </a:t>
-            </a:r>
-            <a:r>
-              <a:rPr lang="en-US" sz="1800" dirty="0" err="1">
+              <a:t>    </a:t>
+            </a:r>
+            <a:r>
+              <a:rPr lang="en-US" sz="1800" b="1" dirty="0">
                 <a:latin typeface="Consolas" pitchFamily="49" charset="0"/>
                 <a:cs typeface="Consolas" pitchFamily="49" charset="0"/>
               </a:rPr>
-              <a:t>instanceof</a:t>
-            </a:r>
-            <a:r>
-              <a:rPr lang="en-US" sz="1800" dirty="0">
+              <a:t>if (expr </a:t>
+            </a:r>
+            <a:r>
+              <a:rPr lang="en-US" sz="1800" b="1" dirty="0" err="1">
                 <a:latin typeface="Consolas" pitchFamily="49" charset="0"/>
                 <a:cs typeface="Consolas" pitchFamily="49" charset="0"/>
               </a:rPr>
-              <a:t> </a:t>
-            </a:r>
-            <a:r>
-              <a:rPr lang="en-US" sz="1800" dirty="0" err="1">
+              <a:t>instanceof</a:t>
+            </a:r>
+            <a:r>
+              <a:rPr lang="en-US" sz="1800" b="1" dirty="0">
                 <a:latin typeface="Consolas" pitchFamily="49" charset="0"/>
                 <a:cs typeface="Consolas" pitchFamily="49" charset="0"/>
               </a:rPr>
+              <a:t> </a:t>
+            </a:r>
+            <a:r>
+              <a:rPr lang="en-US" sz="1800" b="1" dirty="0" err="1">
+                <a:latin typeface="Consolas" pitchFamily="49" charset="0"/>
+                <a:cs typeface="Consolas" pitchFamily="49" charset="0"/>
+              </a:rPr>
               <a:t>VariableExpr</a:t>
             </a:r>
             <a:r>
-              <a:rPr lang="en-US" sz="1800" dirty="0">
+              <a:rPr lang="en-US" sz="1800" b="1" dirty="0">
+                <a:latin typeface="Consolas" pitchFamily="49" charset="0"/>
+                <a:cs typeface="Consolas" pitchFamily="49" charset="0"/>
+              </a:rPr>
+              <a:t> </a:t>
+            </a:r>
+            <a:r>
+              <a:rPr lang="en-US" sz="1800" b="1" dirty="0" err="1">
+                <a:latin typeface="Consolas" pitchFamily="49" charset="0"/>
+                <a:cs typeface="Consolas" pitchFamily="49" charset="0"/>
+              </a:rPr>
+              <a:t>variableExpr</a:t>
+            </a:r>
+            <a:r>
+              <a:rPr lang="en-US" sz="1800" b="1" dirty="0">
                 <a:latin typeface="Consolas" pitchFamily="49" charset="0"/>
                 <a:cs typeface="Consolas" pitchFamily="49" charset="0"/>
               </a:rPr>
@@ -26454,7 +26489,7 @@
               <a:buNone/>
             </a:pPr>
             <a:r>
-              <a:rPr lang="en-US" sz="1800" dirty="0">
+              <a:rPr lang="en-US" sz="1800" b="1" dirty="0">
                 <a:latin typeface="Consolas" pitchFamily="49" charset="0"/>
                 <a:cs typeface="Consolas" pitchFamily="49" charset="0"/>
               </a:rPr>
@@ -26469,25 +26504,11 @@
               <a:buNone/>
             </a:pPr>
             <a:r>
-              <a:rPr lang="en-US" sz="1800" dirty="0">
+              <a:rPr lang="en-US" sz="1800" b="1" dirty="0">
                 <a:latin typeface="Consolas" pitchFamily="49" charset="0"/>
                 <a:cs typeface="Consolas" pitchFamily="49" charset="0"/>
               </a:rPr>
-              <a:t>        // replace </a:t>
-            </a:r>
-            <a:r>
-              <a:rPr lang="en-US" sz="1800" dirty="0" err="1">
-                <a:latin typeface="Consolas" pitchFamily="49" charset="0"/>
-                <a:cs typeface="Consolas" pitchFamily="49" charset="0"/>
-              </a:rPr>
-              <a:t>variale</a:t>
-            </a:r>
-            <a:r>
-              <a:rPr lang="en-US" sz="1800" dirty="0">
-                <a:latin typeface="Consolas" pitchFamily="49" charset="0"/>
-                <a:cs typeface="Consolas" pitchFamily="49" charset="0"/>
-              </a:rPr>
-              <a:t> expression by a variable</a:t>
+              <a:t>        // replace a variable expression by a variable</a:t>
             </a:r>
           </a:p>
           <a:p>
@@ -26498,25 +26519,25 @@
               <a:buNone/>
             </a:pPr>
             <a:r>
-              <a:rPr lang="en-US" sz="1800" dirty="0">
+              <a:rPr lang="en-US" sz="1800" b="1" dirty="0">
                 <a:latin typeface="Consolas" pitchFamily="49" charset="0"/>
                 <a:cs typeface="Consolas" pitchFamily="49" charset="0"/>
               </a:rPr>
-              <a:t>        expr = new Variable((</a:t>
-            </a:r>
-            <a:r>
-              <a:rPr lang="en-US" sz="1800" dirty="0" err="1">
+              <a:t>        expr = new Variable(</a:t>
+            </a:r>
+            <a:r>
+              <a:rPr lang="en-US" sz="1800" b="1" dirty="0" err="1">
                 <a:latin typeface="Consolas" pitchFamily="49" charset="0"/>
                 <a:cs typeface="Consolas" pitchFamily="49" charset="0"/>
               </a:rPr>
-              <a:t>VariableExpr</a:t>
-            </a:r>
-            <a:r>
-              <a:rPr lang="en-US" sz="1800" dirty="0">
+              <a:t>variableExpr</a:t>
+            </a:r>
+            <a:r>
+              <a:rPr lang="en-US" sz="1800" b="1" dirty="0">
                 <a:latin typeface="Consolas" pitchFamily="49" charset="0"/>
                 <a:cs typeface="Consolas" pitchFamily="49" charset="0"/>
               </a:rPr>
-              <a:t>) expr);</a:t>
+              <a:t>);</a:t>
             </a:r>
           </a:p>
           <a:p>
@@ -26527,21 +26548,21 @@
               <a:buNone/>
             </a:pPr>
             <a:r>
-              <a:rPr lang="en-US" sz="1800" dirty="0">
+              <a:rPr lang="en-US" sz="1800" b="1" dirty="0">
                 <a:latin typeface="Consolas" pitchFamily="49" charset="0"/>
                 <a:cs typeface="Consolas" pitchFamily="49" charset="0"/>
               </a:rPr>
               <a:t>        </a:t>
             </a:r>
             <a:r>
-              <a:rPr lang="en-US" sz="1800" dirty="0" err="1">
+              <a:rPr lang="en-US" sz="1800" b="1" dirty="0" err="1">
                 <a:latin typeface="Consolas" pitchFamily="49" charset="0"/>
                 <a:cs typeface="Consolas" pitchFamily="49" charset="0"/>
               </a:rPr>
               <a:t>actualParams.set</a:t>
             </a:r>
             <a:r>
-              <a:rPr lang="en-US" sz="1800" dirty="0">
+              <a:rPr lang="en-US" sz="1800" b="1" dirty="0">
                 <a:latin typeface="Consolas" pitchFamily="49" charset="0"/>
                 <a:cs typeface="Consolas" pitchFamily="49" charset="0"/>
               </a:rPr>
@@ -26556,7 +26577,7 @@
               <a:buNone/>
             </a:pPr>
             <a:r>
-              <a:rPr lang="en-US" sz="1800" dirty="0">
+              <a:rPr lang="en-US" sz="1800" b="1" dirty="0">
                 <a:latin typeface="Consolas" pitchFamily="49" charset="0"/>
                 <a:cs typeface="Consolas" pitchFamily="49" charset="0"/>
               </a:rPr>
@@ -26678,21 +26699,6 @@
                 <a:cs typeface="Consolas" pitchFamily="49" charset="0"/>
               </a:rPr>
               <a:t>);</a:t>
-            </a:r>
-          </a:p>
-          <a:p>
-            <a:pPr marL="0" indent="0">
-              <a:spcBef>
-                <a:spcPts val="100"/>
-              </a:spcBef>
-              <a:buNone/>
-            </a:pPr>
-            <a:r>
-              <a:rPr lang="en-US" sz="1800" dirty="0">
-                <a:latin typeface="Consolas" pitchFamily="49" charset="0"/>
-                <a:cs typeface="Consolas" pitchFamily="49" charset="0"/>
-              </a:rPr>
-              <a:t>      }</a:t>
             </a:r>
           </a:p>
           <a:p>

</xml_diff>